<commit_message>
Add adder and subtractor jupyter file and modify model
</commit_message>
<xml_diff>
--- a/hw2.pptx
+++ b/hw2.pptx
@@ -9,7 +9,10 @@
     <p:sldId id="257" r:id="rId3"/>
     <p:sldId id="258" r:id="rId4"/>
     <p:sldId id="259" r:id="rId5"/>
-    <p:sldId id="260" r:id="rId6"/>
+    <p:sldId id="261" r:id="rId6"/>
+    <p:sldId id="262" r:id="rId7"/>
+    <p:sldId id="263" r:id="rId8"/>
+    <p:sldId id="260" r:id="rId9"/>
   </p:sldIdLst>
   <p:sldSz cx="12192000" cy="6858000"/>
   <p:notesSz cx="6858000" cy="9144000"/>
@@ -108,6 +111,11 @@
       </a:defRPr>
     </a:lvl9pPr>
   </p:defaultTextStyle>
+  <p:extLst>
+    <p:ext uri="{EFAFB233-063F-42B5-8137-9DF3F51BA10A}">
+      <p15:sldGuideLst xmlns:p15="http://schemas.microsoft.com/office/powerpoint/2012/main"/>
+    </p:ext>
+  </p:extLst>
 </p:presentation>
 </file>
 
@@ -4138,7 +4146,7 @@
         </p:spPr>
         <p:txBody>
           <a:bodyPr>
-            <a:normAutofit lnSpcReduction="10000"/>
+            <a:normAutofit fontScale="92500" lnSpcReduction="10000"/>
           </a:bodyPr>
           <a:lstStyle/>
           <a:p>
@@ -4280,13 +4288,47 @@
             </a:endParaRPr>
           </a:p>
           <a:p>
+            <a:r>
+              <a:rPr lang="en-US" altLang="zh-TW" dirty="0">
+                <a:latin typeface="標楷體" panose="03000509000000000000" pitchFamily="65" charset="-120"/>
+                <a:ea typeface="標楷體" panose="03000509000000000000" pitchFamily="65" charset="-120"/>
+              </a:rPr>
+              <a:t>3.</a:t>
+            </a:r>
+            <a:r>
+              <a:rPr lang="zh-TW" altLang="en-US" dirty="0">
+                <a:latin typeface="標楷體" panose="03000509000000000000" pitchFamily="65" charset="-120"/>
+                <a:ea typeface="標楷體" panose="03000509000000000000" pitchFamily="65" charset="-120"/>
+              </a:rPr>
+              <a:t>模型挑選</a:t>
+            </a:r>
+            <a:r>
+              <a:rPr lang="en-US" altLang="zh-TW" dirty="0">
+                <a:latin typeface="標楷體" panose="03000509000000000000" pitchFamily="65" charset="-120"/>
+                <a:ea typeface="標楷體" panose="03000509000000000000" pitchFamily="65" charset="-120"/>
+              </a:rPr>
+              <a:t>(1)-</a:t>
+            </a:r>
+            <a:r>
+              <a:rPr lang="zh-TW" altLang="en-US" dirty="0">
+                <a:latin typeface="標楷體" panose="03000509000000000000" pitchFamily="65" charset="-120"/>
+                <a:ea typeface="標楷體" panose="03000509000000000000" pitchFamily="65" charset="-120"/>
+              </a:rPr>
+              <a:t>全連接層</a:t>
+            </a:r>
+            <a:endParaRPr lang="en-US" altLang="zh-TW" dirty="0">
+              <a:latin typeface="標楷體" panose="03000509000000000000" pitchFamily="65" charset="-120"/>
+              <a:ea typeface="標楷體" panose="03000509000000000000" pitchFamily="65" charset="-120"/>
+            </a:endParaRPr>
+          </a:p>
+          <a:p>
             <a:pPr lvl="1"/>
             <a:r>
               <a:rPr lang="zh-TW" altLang="en-US" dirty="0">
                 <a:latin typeface="標楷體" panose="03000509000000000000" pitchFamily="65" charset="-120"/>
                 <a:ea typeface="標楷體" panose="03000509000000000000" pitchFamily="65" charset="-120"/>
               </a:rPr>
-              <a:t>使用</a:t>
+              <a:t>原先使用</a:t>
             </a:r>
             <a:r>
               <a:rPr lang="en-US" altLang="zh-TW" dirty="0">
@@ -4586,6 +4628,1252 @@
                 <a:latin typeface="標楷體" panose="03000509000000000000" pitchFamily="65" charset="-120"/>
                 <a:ea typeface="標楷體" panose="03000509000000000000" pitchFamily="65" charset="-120"/>
               </a:rPr>
+              <a:t>模型建置與訓練</a:t>
+            </a:r>
+          </a:p>
+        </p:txBody>
+      </p:sp>
+      <p:sp>
+        <p:nvSpPr>
+          <p:cNvPr id="3" name="內容版面配置區 2">
+            <a:extLst>
+              <a:ext uri="{FF2B5EF4-FFF2-40B4-BE49-F238E27FC236}">
+                <a16:creationId xmlns:a16="http://schemas.microsoft.com/office/drawing/2014/main" id="{6AC6DDCB-18F5-48C4-9DEB-10C4A97429AD}"/>
+              </a:ext>
+            </a:extLst>
+          </p:cNvPr>
+          <p:cNvSpPr>
+            <a:spLocks noGrp="1"/>
+          </p:cNvSpPr>
+          <p:nvPr>
+            <p:ph idx="1"/>
+          </p:nvPr>
+        </p:nvSpPr>
+        <p:spPr>
+          <a:xfrm>
+            <a:off x="838200" y="1825624"/>
+            <a:ext cx="10515600" cy="4563143"/>
+          </a:xfrm>
+        </p:spPr>
+        <p:txBody>
+          <a:bodyPr>
+            <a:normAutofit fontScale="92500"/>
+          </a:bodyPr>
+          <a:lstStyle/>
+          <a:p>
+            <a:r>
+              <a:rPr lang="en-US" altLang="zh-TW" dirty="0">
+                <a:latin typeface="標楷體" panose="03000509000000000000" pitchFamily="65" charset="-120"/>
+                <a:ea typeface="標楷體" panose="03000509000000000000" pitchFamily="65" charset="-120"/>
+              </a:rPr>
+              <a:t>3.</a:t>
+            </a:r>
+            <a:r>
+              <a:rPr lang="zh-TW" altLang="en-US" dirty="0">
+                <a:latin typeface="標楷體" panose="03000509000000000000" pitchFamily="65" charset="-120"/>
+                <a:ea typeface="標楷體" panose="03000509000000000000" pitchFamily="65" charset="-120"/>
+              </a:rPr>
+              <a:t>模型挑選</a:t>
+            </a:r>
+            <a:r>
+              <a:rPr lang="en-US" altLang="zh-TW" dirty="0">
+                <a:latin typeface="標楷體" panose="03000509000000000000" pitchFamily="65" charset="-120"/>
+                <a:ea typeface="標楷體" panose="03000509000000000000" pitchFamily="65" charset="-120"/>
+              </a:rPr>
+              <a:t>(1)-</a:t>
+            </a:r>
+            <a:r>
+              <a:rPr lang="zh-TW" altLang="en-US" dirty="0">
+                <a:latin typeface="標楷體" panose="03000509000000000000" pitchFamily="65" charset="-120"/>
+                <a:ea typeface="標楷體" panose="03000509000000000000" pitchFamily="65" charset="-120"/>
+              </a:rPr>
+              <a:t>全連接層</a:t>
+            </a:r>
+            <a:endParaRPr lang="en-US" altLang="zh-TW" dirty="0">
+              <a:latin typeface="標楷體" panose="03000509000000000000" pitchFamily="65" charset="-120"/>
+              <a:ea typeface="標楷體" panose="03000509000000000000" pitchFamily="65" charset="-120"/>
+            </a:endParaRPr>
+          </a:p>
+          <a:p>
+            <a:pPr lvl="1"/>
+            <a:r>
+              <a:rPr lang="zh-TW" altLang="en-US" dirty="0">
+                <a:latin typeface="標楷體" panose="03000509000000000000" pitchFamily="65" charset="-120"/>
+                <a:ea typeface="標楷體" panose="03000509000000000000" pitchFamily="65" charset="-120"/>
+              </a:rPr>
+              <a:t>使用</a:t>
+            </a:r>
+            <a:r>
+              <a:rPr lang="en-US" altLang="zh-TW" dirty="0">
+                <a:latin typeface="標楷體" panose="03000509000000000000" pitchFamily="65" charset="-120"/>
+                <a:ea typeface="標楷體" panose="03000509000000000000" pitchFamily="65" charset="-120"/>
+              </a:rPr>
+              <a:t>flatten</a:t>
+            </a:r>
+            <a:r>
+              <a:rPr lang="zh-TW" altLang="en-US" dirty="0">
+                <a:latin typeface="標楷體" panose="03000509000000000000" pitchFamily="65" charset="-120"/>
+                <a:ea typeface="標楷體" panose="03000509000000000000" pitchFamily="65" charset="-120"/>
+              </a:rPr>
+              <a:t>再用</a:t>
+            </a:r>
+            <a:r>
+              <a:rPr lang="en-US" altLang="zh-TW" dirty="0">
+                <a:latin typeface="標楷體" panose="03000509000000000000" pitchFamily="65" charset="-120"/>
+                <a:ea typeface="標楷體" panose="03000509000000000000" pitchFamily="65" charset="-120"/>
+              </a:rPr>
+              <a:t>dense</a:t>
+            </a:r>
+            <a:r>
+              <a:rPr lang="zh-TW" altLang="en-US" dirty="0">
+                <a:latin typeface="標楷體" panose="03000509000000000000" pitchFamily="65" charset="-120"/>
+                <a:ea typeface="標楷體" panose="03000509000000000000" pitchFamily="65" charset="-120"/>
+              </a:rPr>
+              <a:t>訓練會導致資訊混亂以至於都學不到東西</a:t>
+            </a:r>
+            <a:endParaRPr lang="en-US" altLang="zh-TW" dirty="0">
+              <a:latin typeface="標楷體" panose="03000509000000000000" pitchFamily="65" charset="-120"/>
+              <a:ea typeface="標楷體" panose="03000509000000000000" pitchFamily="65" charset="-120"/>
+            </a:endParaRPr>
+          </a:p>
+          <a:p>
+            <a:pPr lvl="1"/>
+            <a:r>
+              <a:rPr lang="zh-TW" altLang="en-US" dirty="0">
+                <a:latin typeface="標楷體" panose="03000509000000000000" pitchFamily="65" charset="-120"/>
+                <a:ea typeface="標楷體" panose="03000509000000000000" pitchFamily="65" charset="-120"/>
+              </a:rPr>
+              <a:t>結果</a:t>
+            </a:r>
+            <a:r>
+              <a:rPr lang="en-US" altLang="zh-TW" dirty="0">
+                <a:latin typeface="標楷體" panose="03000509000000000000" pitchFamily="65" charset="-120"/>
+                <a:ea typeface="標楷體" panose="03000509000000000000" pitchFamily="65" charset="-120"/>
+              </a:rPr>
+              <a:t>accuracy</a:t>
+            </a:r>
+            <a:r>
+              <a:rPr lang="zh-TW" altLang="en-US" dirty="0">
+                <a:latin typeface="標楷體" panose="03000509000000000000" pitchFamily="65" charset="-120"/>
+                <a:ea typeface="標楷體" panose="03000509000000000000" pitchFamily="65" charset="-120"/>
+              </a:rPr>
+              <a:t>不足</a:t>
+            </a:r>
+            <a:r>
+              <a:rPr lang="en-US" altLang="zh-TW" dirty="0">
+                <a:latin typeface="標楷體" panose="03000509000000000000" pitchFamily="65" charset="-120"/>
+                <a:ea typeface="標楷體" panose="03000509000000000000" pitchFamily="65" charset="-120"/>
+              </a:rPr>
+              <a:t>5%</a:t>
+            </a:r>
+          </a:p>
+          <a:p>
+            <a:r>
+              <a:rPr lang="en-US" altLang="zh-TW" dirty="0">
+                <a:latin typeface="標楷體" panose="03000509000000000000" pitchFamily="65" charset="-120"/>
+                <a:ea typeface="標楷體" panose="03000509000000000000" pitchFamily="65" charset="-120"/>
+              </a:rPr>
+              <a:t>4.</a:t>
+            </a:r>
+            <a:r>
+              <a:rPr lang="zh-TW" altLang="en-US" dirty="0">
+                <a:latin typeface="標楷體" panose="03000509000000000000" pitchFamily="65" charset="-120"/>
+                <a:ea typeface="標楷體" panose="03000509000000000000" pitchFamily="65" charset="-120"/>
+              </a:rPr>
+              <a:t>模型挑選</a:t>
+            </a:r>
+            <a:r>
+              <a:rPr lang="en-US" altLang="zh-TW" dirty="0">
+                <a:latin typeface="標楷體" panose="03000509000000000000" pitchFamily="65" charset="-120"/>
+                <a:ea typeface="標楷體" panose="03000509000000000000" pitchFamily="65" charset="-120"/>
+              </a:rPr>
+              <a:t>(1)-</a:t>
+            </a:r>
+            <a:r>
+              <a:rPr lang="zh-TW" altLang="en-US" dirty="0">
+                <a:latin typeface="標楷體" panose="03000509000000000000" pitchFamily="65" charset="-120"/>
+                <a:ea typeface="標楷體" panose="03000509000000000000" pitchFamily="65" charset="-120"/>
+              </a:rPr>
+              <a:t>序列模型</a:t>
+            </a:r>
+            <a:r>
+              <a:rPr lang="en-US" altLang="zh-TW" dirty="0">
+                <a:latin typeface="標楷體" panose="03000509000000000000" pitchFamily="65" charset="-120"/>
+                <a:ea typeface="標楷體" panose="03000509000000000000" pitchFamily="65" charset="-120"/>
+              </a:rPr>
+              <a:t>LSTM</a:t>
+            </a:r>
+          </a:p>
+          <a:p>
+            <a:pPr lvl="1"/>
+            <a:r>
+              <a:rPr lang="zh-TW" altLang="en-US" dirty="0">
+                <a:latin typeface="標楷體" panose="03000509000000000000" pitchFamily="65" charset="-120"/>
+                <a:ea typeface="標楷體" panose="03000509000000000000" pitchFamily="65" charset="-120"/>
+              </a:rPr>
+              <a:t>有先後順序的字串較適合使用</a:t>
+            </a:r>
+            <a:r>
+              <a:rPr lang="en-US" altLang="zh-TW" dirty="0">
+                <a:latin typeface="標楷體" panose="03000509000000000000" pitchFamily="65" charset="-120"/>
+                <a:ea typeface="標楷體" panose="03000509000000000000" pitchFamily="65" charset="-120"/>
+              </a:rPr>
+              <a:t>RNN</a:t>
+            </a:r>
+            <a:r>
+              <a:rPr lang="zh-TW" altLang="en-US" dirty="0">
+                <a:latin typeface="標楷體" panose="03000509000000000000" pitchFamily="65" charset="-120"/>
+                <a:ea typeface="標楷體" panose="03000509000000000000" pitchFamily="65" charset="-120"/>
+              </a:rPr>
+              <a:t>系列的</a:t>
+            </a:r>
+            <a:r>
+              <a:rPr lang="en-US" altLang="zh-TW" dirty="0">
+                <a:latin typeface="標楷體" panose="03000509000000000000" pitchFamily="65" charset="-120"/>
+                <a:ea typeface="標楷體" panose="03000509000000000000" pitchFamily="65" charset="-120"/>
+              </a:rPr>
+              <a:t>sequential</a:t>
+            </a:r>
+            <a:r>
+              <a:rPr lang="zh-TW" altLang="en-US" dirty="0">
+                <a:latin typeface="標楷體" panose="03000509000000000000" pitchFamily="65" charset="-120"/>
+                <a:ea typeface="標楷體" panose="03000509000000000000" pitchFamily="65" charset="-120"/>
+              </a:rPr>
+              <a:t> </a:t>
+            </a:r>
+            <a:r>
+              <a:rPr lang="en-US" altLang="zh-TW" dirty="0">
+                <a:latin typeface="標楷體" panose="03000509000000000000" pitchFamily="65" charset="-120"/>
+                <a:ea typeface="標楷體" panose="03000509000000000000" pitchFamily="65" charset="-120"/>
+              </a:rPr>
+              <a:t>mode</a:t>
+            </a:r>
+            <a:r>
+              <a:rPr lang="zh-TW" altLang="en-US" dirty="0">
+                <a:latin typeface="標楷體" panose="03000509000000000000" pitchFamily="65" charset="-120"/>
+                <a:ea typeface="標楷體" panose="03000509000000000000" pitchFamily="65" charset="-120"/>
+              </a:rPr>
+              <a:t>來解，在此使用</a:t>
+            </a:r>
+            <a:r>
+              <a:rPr lang="en-US" altLang="zh-TW" dirty="0">
+                <a:latin typeface="標楷體" panose="03000509000000000000" pitchFamily="65" charset="-120"/>
+                <a:ea typeface="標楷體" panose="03000509000000000000" pitchFamily="65" charset="-120"/>
+              </a:rPr>
+              <a:t>LSTM</a:t>
+            </a:r>
+          </a:p>
+          <a:p>
+            <a:pPr lvl="1"/>
+            <a:r>
+              <a:rPr lang="zh-TW" altLang="en-US" dirty="0">
+                <a:latin typeface="標楷體" panose="03000509000000000000" pitchFamily="65" charset="-120"/>
+                <a:ea typeface="標楷體" panose="03000509000000000000" pitchFamily="65" charset="-120"/>
+              </a:rPr>
+              <a:t>將每個字元</a:t>
+            </a:r>
+            <a:r>
+              <a:rPr lang="en-US" altLang="zh-TW" dirty="0">
+                <a:latin typeface="標楷體" panose="03000509000000000000" pitchFamily="65" charset="-120"/>
+                <a:ea typeface="標楷體" panose="03000509000000000000" pitchFamily="65" charset="-120"/>
+              </a:rPr>
+              <a:t>(</a:t>
+            </a:r>
+            <a:r>
+              <a:rPr lang="zh-TW" altLang="en-US" dirty="0">
+                <a:latin typeface="標楷體" panose="03000509000000000000" pitchFamily="65" charset="-120"/>
+                <a:ea typeface="標楷體" panose="03000509000000000000" pitchFamily="65" charset="-120"/>
+              </a:rPr>
+              <a:t>數字或符號</a:t>
+            </a:r>
+            <a:r>
+              <a:rPr lang="en-US" altLang="zh-TW" dirty="0">
+                <a:latin typeface="標楷體" panose="03000509000000000000" pitchFamily="65" charset="-120"/>
+                <a:ea typeface="標楷體" panose="03000509000000000000" pitchFamily="65" charset="-120"/>
+              </a:rPr>
+              <a:t>)</a:t>
+            </a:r>
+            <a:r>
+              <a:rPr lang="zh-TW" altLang="en-US" dirty="0">
+                <a:latin typeface="標楷體" panose="03000509000000000000" pitchFamily="65" charset="-120"/>
+                <a:ea typeface="標楷體" panose="03000509000000000000" pitchFamily="65" charset="-120"/>
+              </a:rPr>
+              <a:t>依序餵入</a:t>
+            </a:r>
+            <a:r>
+              <a:rPr lang="en-US" altLang="zh-TW" dirty="0">
+                <a:latin typeface="標楷體" panose="03000509000000000000" pitchFamily="65" charset="-120"/>
+                <a:ea typeface="標楷體" panose="03000509000000000000" pitchFamily="65" charset="-120"/>
+              </a:rPr>
+              <a:t>LSTM</a:t>
+            </a:r>
+            <a:r>
+              <a:rPr lang="zh-TW" altLang="en-US" dirty="0">
+                <a:latin typeface="標楷體" panose="03000509000000000000" pitchFamily="65" charset="-120"/>
+                <a:ea typeface="標楷體" panose="03000509000000000000" pitchFamily="65" charset="-120"/>
+              </a:rPr>
+              <a:t>中</a:t>
+            </a:r>
+            <a:endParaRPr lang="en-US" altLang="zh-TW" dirty="0">
+              <a:latin typeface="標楷體" panose="03000509000000000000" pitchFamily="65" charset="-120"/>
+              <a:ea typeface="標楷體" panose="03000509000000000000" pitchFamily="65" charset="-120"/>
+            </a:endParaRPr>
+          </a:p>
+          <a:p>
+            <a:pPr lvl="1"/>
+            <a:r>
+              <a:rPr lang="zh-TW" altLang="en-US" dirty="0">
+                <a:latin typeface="標楷體" panose="03000509000000000000" pitchFamily="65" charset="-120"/>
+                <a:ea typeface="標楷體" panose="03000509000000000000" pitchFamily="65" charset="-120"/>
+              </a:rPr>
+              <a:t>再將</a:t>
+            </a:r>
+            <a:r>
+              <a:rPr lang="en-US" altLang="zh-TW" dirty="0">
+                <a:latin typeface="標楷體" panose="03000509000000000000" pitchFamily="65" charset="-120"/>
+                <a:ea typeface="標楷體" panose="03000509000000000000" pitchFamily="65" charset="-120"/>
+              </a:rPr>
+              <a:t>output</a:t>
+            </a:r>
+            <a:r>
+              <a:rPr lang="zh-TW" altLang="en-US" dirty="0">
+                <a:latin typeface="標楷體" panose="03000509000000000000" pitchFamily="65" charset="-120"/>
+                <a:ea typeface="標楷體" panose="03000509000000000000" pitchFamily="65" charset="-120"/>
+              </a:rPr>
+              <a:t>的</a:t>
+            </a:r>
+            <a:r>
+              <a:rPr lang="en-US" altLang="zh-TW" dirty="0">
+                <a:latin typeface="標楷體" panose="03000509000000000000" pitchFamily="65" charset="-120"/>
+                <a:ea typeface="標楷體" panose="03000509000000000000" pitchFamily="65" charset="-120"/>
+              </a:rPr>
+              <a:t>vector </a:t>
+            </a:r>
+            <a:r>
+              <a:rPr lang="zh-TW" altLang="en-US" dirty="0">
+                <a:latin typeface="標楷體" panose="03000509000000000000" pitchFamily="65" charset="-120"/>
+                <a:ea typeface="標楷體" panose="03000509000000000000" pitchFamily="65" charset="-120"/>
+              </a:rPr>
+              <a:t>使用</a:t>
+            </a:r>
+            <a:r>
+              <a:rPr lang="en-US" altLang="zh-TW" dirty="0" err="1">
+                <a:latin typeface="標楷體" panose="03000509000000000000" pitchFamily="65" charset="-120"/>
+                <a:ea typeface="標楷體" panose="03000509000000000000" pitchFamily="65" charset="-120"/>
+              </a:rPr>
+              <a:t>Repeatvector</a:t>
+            </a:r>
+            <a:r>
+              <a:rPr lang="en-US" altLang="zh-TW" dirty="0">
+                <a:latin typeface="標楷體" panose="03000509000000000000" pitchFamily="65" charset="-120"/>
+                <a:ea typeface="標楷體" panose="03000509000000000000" pitchFamily="65" charset="-120"/>
+              </a:rPr>
+              <a:t> </a:t>
+            </a:r>
+            <a:r>
+              <a:rPr lang="zh-TW" altLang="en-US" dirty="0">
+                <a:latin typeface="標楷體" panose="03000509000000000000" pitchFamily="65" charset="-120"/>
+                <a:ea typeface="標楷體" panose="03000509000000000000" pitchFamily="65" charset="-120"/>
+              </a:rPr>
+              <a:t>複製成</a:t>
+            </a:r>
+            <a:r>
+              <a:rPr lang="en-US" altLang="zh-TW" dirty="0">
+                <a:latin typeface="標楷體" panose="03000509000000000000" pitchFamily="65" charset="-120"/>
+                <a:ea typeface="標楷體" panose="03000509000000000000" pitchFamily="65" charset="-120"/>
+              </a:rPr>
+              <a:t>4</a:t>
+            </a:r>
+            <a:r>
+              <a:rPr lang="zh-TW" altLang="en-US" dirty="0">
+                <a:latin typeface="標楷體" panose="03000509000000000000" pitchFamily="65" charset="-120"/>
+                <a:ea typeface="標楷體" panose="03000509000000000000" pitchFamily="65" charset="-120"/>
+              </a:rPr>
+              <a:t>份</a:t>
+            </a:r>
+            <a:r>
+              <a:rPr lang="en-US" altLang="zh-TW" dirty="0">
+                <a:latin typeface="標楷體" panose="03000509000000000000" pitchFamily="65" charset="-120"/>
+                <a:ea typeface="標楷體" panose="03000509000000000000" pitchFamily="65" charset="-120"/>
+              </a:rPr>
+              <a:t>vector</a:t>
+            </a:r>
+            <a:r>
+              <a:rPr lang="zh-TW" altLang="en-US" dirty="0">
+                <a:latin typeface="標楷體" panose="03000509000000000000" pitchFamily="65" charset="-120"/>
+                <a:ea typeface="標楷體" panose="03000509000000000000" pitchFamily="65" charset="-120"/>
+              </a:rPr>
+              <a:t>來個別學</a:t>
+            </a:r>
+            <a:r>
+              <a:rPr lang="en-US" altLang="zh-TW" dirty="0">
+                <a:latin typeface="標楷體" panose="03000509000000000000" pitchFamily="65" charset="-120"/>
+                <a:ea typeface="標楷體" panose="03000509000000000000" pitchFamily="65" charset="-120"/>
+              </a:rPr>
+              <a:t>output</a:t>
+            </a:r>
+            <a:r>
+              <a:rPr lang="zh-TW" altLang="en-US" dirty="0">
+                <a:latin typeface="標楷體" panose="03000509000000000000" pitchFamily="65" charset="-120"/>
+                <a:ea typeface="標楷體" panose="03000509000000000000" pitchFamily="65" charset="-120"/>
+              </a:rPr>
+              <a:t>的</a:t>
+            </a:r>
+            <a:r>
+              <a:rPr lang="en-US" altLang="zh-TW" dirty="0">
+                <a:latin typeface="標楷體" panose="03000509000000000000" pitchFamily="65" charset="-120"/>
+                <a:ea typeface="標楷體" panose="03000509000000000000" pitchFamily="65" charset="-120"/>
+              </a:rPr>
+              <a:t>4</a:t>
+            </a:r>
+            <a:r>
+              <a:rPr lang="zh-TW" altLang="en-US" dirty="0">
+                <a:latin typeface="標楷體" panose="03000509000000000000" pitchFamily="65" charset="-120"/>
+                <a:ea typeface="標楷體" panose="03000509000000000000" pitchFamily="65" charset="-120"/>
+              </a:rPr>
+              <a:t>個符號</a:t>
+            </a:r>
+            <a:endParaRPr lang="en-US" altLang="zh-TW" dirty="0">
+              <a:latin typeface="標楷體" panose="03000509000000000000" pitchFamily="65" charset="-120"/>
+              <a:ea typeface="標楷體" panose="03000509000000000000" pitchFamily="65" charset="-120"/>
+            </a:endParaRPr>
+          </a:p>
+          <a:p>
+            <a:pPr lvl="1"/>
+            <a:r>
+              <a:rPr lang="zh-TW" altLang="en-US" dirty="0">
+                <a:latin typeface="標楷體" panose="03000509000000000000" pitchFamily="65" charset="-120"/>
+                <a:ea typeface="標楷體" panose="03000509000000000000" pitchFamily="65" charset="-120"/>
+              </a:rPr>
+              <a:t>再將</a:t>
+            </a:r>
+            <a:r>
+              <a:rPr lang="en-US" altLang="zh-TW" dirty="0">
+                <a:latin typeface="標楷體" panose="03000509000000000000" pitchFamily="65" charset="-120"/>
+                <a:ea typeface="標楷體" panose="03000509000000000000" pitchFamily="65" charset="-120"/>
+              </a:rPr>
+              <a:t>4</a:t>
+            </a:r>
+            <a:r>
+              <a:rPr lang="zh-TW" altLang="en-US" dirty="0">
+                <a:latin typeface="標楷體" panose="03000509000000000000" pitchFamily="65" charset="-120"/>
+                <a:ea typeface="標楷體" panose="03000509000000000000" pitchFamily="65" charset="-120"/>
+              </a:rPr>
+              <a:t>個</a:t>
+            </a:r>
+            <a:r>
+              <a:rPr lang="en-US" altLang="zh-TW" dirty="0">
+                <a:latin typeface="標楷體" panose="03000509000000000000" pitchFamily="65" charset="-120"/>
+                <a:ea typeface="標楷體" panose="03000509000000000000" pitchFamily="65" charset="-120"/>
+              </a:rPr>
+              <a:t>vector</a:t>
+            </a:r>
+            <a:r>
+              <a:rPr lang="zh-TW" altLang="en-US" dirty="0">
+                <a:latin typeface="標楷體" panose="03000509000000000000" pitchFamily="65" charset="-120"/>
+                <a:ea typeface="標楷體" panose="03000509000000000000" pitchFamily="65" charset="-120"/>
+              </a:rPr>
+              <a:t>送進下一個</a:t>
+            </a:r>
+            <a:r>
+              <a:rPr lang="en-US" altLang="zh-TW" dirty="0">
+                <a:latin typeface="標楷體" panose="03000509000000000000" pitchFamily="65" charset="-120"/>
+                <a:ea typeface="標楷體" panose="03000509000000000000" pitchFamily="65" charset="-120"/>
+              </a:rPr>
+              <a:t>LSTM</a:t>
+            </a:r>
+            <a:r>
+              <a:rPr lang="zh-TW" altLang="en-US" dirty="0">
+                <a:latin typeface="標楷體" panose="03000509000000000000" pitchFamily="65" charset="-120"/>
+                <a:ea typeface="標楷體" panose="03000509000000000000" pitchFamily="65" charset="-120"/>
+              </a:rPr>
+              <a:t>中學習，並設定</a:t>
+            </a:r>
+            <a:r>
+              <a:rPr lang="en-US" altLang="zh-TW" dirty="0" err="1">
+                <a:latin typeface="標楷體" panose="03000509000000000000" pitchFamily="65" charset="-120"/>
+                <a:ea typeface="標楷體" panose="03000509000000000000" pitchFamily="65" charset="-120"/>
+              </a:rPr>
+              <a:t>return_sequences</a:t>
+            </a:r>
+            <a:r>
+              <a:rPr lang="en-US" altLang="zh-TW" dirty="0">
+                <a:latin typeface="標楷體" panose="03000509000000000000" pitchFamily="65" charset="-120"/>
+                <a:ea typeface="標楷體" panose="03000509000000000000" pitchFamily="65" charset="-120"/>
+              </a:rPr>
+              <a:t>=True</a:t>
+            </a:r>
+            <a:r>
+              <a:rPr lang="zh-TW" altLang="en-US" dirty="0">
+                <a:latin typeface="標楷體" panose="03000509000000000000" pitchFamily="65" charset="-120"/>
+                <a:ea typeface="標楷體" panose="03000509000000000000" pitchFamily="65" charset="-120"/>
+              </a:rPr>
+              <a:t>確保後續</a:t>
+            </a:r>
+            <a:r>
+              <a:rPr lang="en-US" altLang="zh-TW" dirty="0">
+                <a:latin typeface="標楷體" panose="03000509000000000000" pitchFamily="65" charset="-120"/>
+                <a:ea typeface="標楷體" panose="03000509000000000000" pitchFamily="65" charset="-120"/>
+              </a:rPr>
+              <a:t>dense</a:t>
+            </a:r>
+            <a:r>
+              <a:rPr lang="zh-TW" altLang="en-US" dirty="0">
+                <a:latin typeface="標楷體" panose="03000509000000000000" pitchFamily="65" charset="-120"/>
+                <a:ea typeface="標楷體" panose="03000509000000000000" pitchFamily="65" charset="-120"/>
+              </a:rPr>
+              <a:t> </a:t>
+            </a:r>
+            <a:r>
+              <a:rPr lang="en-US" altLang="zh-TW" dirty="0">
+                <a:latin typeface="標楷體" panose="03000509000000000000" pitchFamily="65" charset="-120"/>
+                <a:ea typeface="標楷體" panose="03000509000000000000" pitchFamily="65" charset="-120"/>
+              </a:rPr>
+              <a:t>input</a:t>
+            </a:r>
+            <a:r>
+              <a:rPr lang="zh-TW" altLang="en-US" dirty="0">
+                <a:latin typeface="標楷體" panose="03000509000000000000" pitchFamily="65" charset="-120"/>
+                <a:ea typeface="標楷體" panose="03000509000000000000" pitchFamily="65" charset="-120"/>
+              </a:rPr>
+              <a:t>的維度正確</a:t>
+            </a:r>
+            <a:endParaRPr lang="en-US" altLang="zh-TW" dirty="0">
+              <a:latin typeface="標楷體" panose="03000509000000000000" pitchFamily="65" charset="-120"/>
+              <a:ea typeface="標楷體" panose="03000509000000000000" pitchFamily="65" charset="-120"/>
+            </a:endParaRPr>
+          </a:p>
+          <a:p>
+            <a:pPr lvl="1"/>
+            <a:r>
+              <a:rPr lang="zh-TW" altLang="en-US" dirty="0">
+                <a:latin typeface="標楷體" panose="03000509000000000000" pitchFamily="65" charset="-120"/>
+                <a:ea typeface="標楷體" panose="03000509000000000000" pitchFamily="65" charset="-120"/>
+              </a:rPr>
+              <a:t>後續就多層</a:t>
+            </a:r>
+            <a:r>
+              <a:rPr lang="en-US" altLang="zh-TW" dirty="0">
+                <a:latin typeface="標楷體" panose="03000509000000000000" pitchFamily="65" charset="-120"/>
+                <a:ea typeface="標楷體" panose="03000509000000000000" pitchFamily="65" charset="-120"/>
+              </a:rPr>
+              <a:t>dense</a:t>
+            </a:r>
+            <a:r>
+              <a:rPr lang="zh-TW" altLang="en-US" dirty="0">
+                <a:latin typeface="標楷體" panose="03000509000000000000" pitchFamily="65" charset="-120"/>
+                <a:ea typeface="標楷體" panose="03000509000000000000" pitchFamily="65" charset="-120"/>
+              </a:rPr>
+              <a:t>並在最後一層的</a:t>
+            </a:r>
+            <a:r>
+              <a:rPr lang="en-US" altLang="zh-TW" dirty="0">
+                <a:latin typeface="標楷體" panose="03000509000000000000" pitchFamily="65" charset="-120"/>
+                <a:ea typeface="標楷體" panose="03000509000000000000" pitchFamily="65" charset="-120"/>
+              </a:rPr>
+              <a:t>activate function</a:t>
+            </a:r>
+            <a:r>
+              <a:rPr lang="zh-TW" altLang="en-US" dirty="0">
+                <a:latin typeface="標楷體" panose="03000509000000000000" pitchFamily="65" charset="-120"/>
+                <a:ea typeface="標楷體" panose="03000509000000000000" pitchFamily="65" charset="-120"/>
+              </a:rPr>
+              <a:t>選用</a:t>
+            </a:r>
+            <a:r>
+              <a:rPr lang="en-US" altLang="zh-TW" dirty="0" err="1">
+                <a:latin typeface="標楷體" panose="03000509000000000000" pitchFamily="65" charset="-120"/>
+                <a:ea typeface="標楷體" panose="03000509000000000000" pitchFamily="65" charset="-120"/>
+              </a:rPr>
+              <a:t>softmax</a:t>
+            </a:r>
+            <a:r>
+              <a:rPr lang="zh-TW" altLang="en-US" dirty="0">
+                <a:latin typeface="標楷體" panose="03000509000000000000" pitchFamily="65" charset="-120"/>
+                <a:ea typeface="標楷體" panose="03000509000000000000" pitchFamily="65" charset="-120"/>
+              </a:rPr>
+              <a:t>來符合分類問題</a:t>
+            </a:r>
+            <a:endParaRPr lang="en-US" altLang="zh-TW" dirty="0">
+              <a:latin typeface="標楷體" panose="03000509000000000000" pitchFamily="65" charset="-120"/>
+              <a:ea typeface="標楷體" panose="03000509000000000000" pitchFamily="65" charset="-120"/>
+            </a:endParaRPr>
+          </a:p>
+        </p:txBody>
+      </p:sp>
+    </p:spTree>
+    <p:extLst>
+      <p:ext uri="{BB962C8B-B14F-4D97-AF65-F5344CB8AC3E}">
+        <p14:creationId xmlns:p14="http://schemas.microsoft.com/office/powerpoint/2010/main" val="2285111933"/>
+      </p:ext>
+    </p:extLst>
+  </p:cSld>
+  <p:clrMapOvr>
+    <a:masterClrMapping/>
+  </p:clrMapOvr>
+</p:sld>
+</file>
+
+<file path=ppt/slides/slide6.xml><?xml version="1.0" encoding="utf-8"?>
+<p:sld xmlns:a="http://schemas.openxmlformats.org/drawingml/2006/main" xmlns:r="http://schemas.openxmlformats.org/officeDocument/2006/relationships" xmlns:p="http://schemas.openxmlformats.org/presentationml/2006/main">
+  <p:cSld>
+    <p:spTree>
+      <p:nvGrpSpPr>
+        <p:cNvPr id="1" name=""/>
+        <p:cNvGrpSpPr/>
+        <p:nvPr/>
+      </p:nvGrpSpPr>
+      <p:grpSpPr>
+        <a:xfrm>
+          <a:off x="0" y="0"/>
+          <a:ext cx="0" cy="0"/>
+          <a:chOff x="0" y="0"/>
+          <a:chExt cx="0" cy="0"/>
+        </a:xfrm>
+      </p:grpSpPr>
+      <p:sp>
+        <p:nvSpPr>
+          <p:cNvPr id="2" name="標題 1">
+            <a:extLst>
+              <a:ext uri="{FF2B5EF4-FFF2-40B4-BE49-F238E27FC236}">
+                <a16:creationId xmlns:a16="http://schemas.microsoft.com/office/drawing/2014/main" id="{A5861B89-D1B6-449B-A717-B6084F6F9286}"/>
+              </a:ext>
+            </a:extLst>
+          </p:cNvPr>
+          <p:cNvSpPr>
+            <a:spLocks noGrp="1"/>
+          </p:cNvSpPr>
+          <p:nvPr>
+            <p:ph type="title"/>
+          </p:nvPr>
+        </p:nvSpPr>
+        <p:spPr/>
+        <p:txBody>
+          <a:bodyPr/>
+          <a:lstStyle/>
+          <a:p>
+            <a:pPr algn="ctr"/>
+            <a:r>
+              <a:rPr lang="zh-TW" altLang="en-US" dirty="0">
+                <a:latin typeface="標楷體" panose="03000509000000000000" pitchFamily="65" charset="-120"/>
+                <a:ea typeface="標楷體" panose="03000509000000000000" pitchFamily="65" charset="-120"/>
+              </a:rPr>
+              <a:t>模型訓練過程</a:t>
+            </a:r>
+          </a:p>
+        </p:txBody>
+      </p:sp>
+      <p:sp>
+        <p:nvSpPr>
+          <p:cNvPr id="3" name="內容版面配置區 2">
+            <a:extLst>
+              <a:ext uri="{FF2B5EF4-FFF2-40B4-BE49-F238E27FC236}">
+                <a16:creationId xmlns:a16="http://schemas.microsoft.com/office/drawing/2014/main" id="{6AC6DDCB-18F5-48C4-9DEB-10C4A97429AD}"/>
+              </a:ext>
+            </a:extLst>
+          </p:cNvPr>
+          <p:cNvSpPr>
+            <a:spLocks noGrp="1"/>
+          </p:cNvSpPr>
+          <p:nvPr>
+            <p:ph idx="1"/>
+          </p:nvPr>
+        </p:nvSpPr>
+        <p:spPr>
+          <a:xfrm>
+            <a:off x="838200" y="1825624"/>
+            <a:ext cx="10515600" cy="4563143"/>
+          </a:xfrm>
+        </p:spPr>
+        <p:txBody>
+          <a:bodyPr>
+            <a:normAutofit/>
+          </a:bodyPr>
+          <a:lstStyle/>
+          <a:p>
+            <a:r>
+              <a:rPr lang="en-US" altLang="zh-TW" dirty="0">
+                <a:latin typeface="標楷體" panose="03000509000000000000" pitchFamily="65" charset="-120"/>
+                <a:ea typeface="標楷體" panose="03000509000000000000" pitchFamily="65" charset="-120"/>
+              </a:rPr>
+              <a:t>1.</a:t>
+            </a:r>
+            <a:r>
+              <a:rPr lang="zh-TW" altLang="en-US" dirty="0">
+                <a:latin typeface="標楷體" panose="03000509000000000000" pitchFamily="65" charset="-120"/>
+                <a:ea typeface="標楷體" panose="03000509000000000000" pitchFamily="65" charset="-120"/>
+              </a:rPr>
+              <a:t>模型選用</a:t>
+            </a:r>
+            <a:endParaRPr lang="en-US" altLang="zh-TW" dirty="0">
+              <a:latin typeface="標楷體" panose="03000509000000000000" pitchFamily="65" charset="-120"/>
+              <a:ea typeface="標楷體" panose="03000509000000000000" pitchFamily="65" charset="-120"/>
+            </a:endParaRPr>
+          </a:p>
+          <a:p>
+            <a:pPr lvl="1"/>
+            <a:r>
+              <a:rPr lang="zh-TW" altLang="en-US" dirty="0">
+                <a:latin typeface="標楷體" panose="03000509000000000000" pitchFamily="65" charset="-120"/>
+                <a:ea typeface="標楷體" panose="03000509000000000000" pitchFamily="65" charset="-120"/>
+              </a:rPr>
+              <a:t>純粹</a:t>
+            </a:r>
+            <a:r>
+              <a:rPr lang="en-US" altLang="zh-TW" dirty="0">
+                <a:latin typeface="標楷體" panose="03000509000000000000" pitchFamily="65" charset="-120"/>
+                <a:ea typeface="標楷體" panose="03000509000000000000" pitchFamily="65" charset="-120"/>
+              </a:rPr>
+              <a:t>dense</a:t>
+            </a:r>
+            <a:r>
+              <a:rPr lang="zh-TW" altLang="en-US" dirty="0">
+                <a:latin typeface="標楷體" panose="03000509000000000000" pitchFamily="65" charset="-120"/>
+                <a:ea typeface="標楷體" panose="03000509000000000000" pitchFamily="65" charset="-120"/>
+              </a:rPr>
+              <a:t>以及使用</a:t>
+            </a:r>
+            <a:r>
+              <a:rPr lang="en-US" altLang="zh-TW" dirty="0">
+                <a:latin typeface="標楷體" panose="03000509000000000000" pitchFamily="65" charset="-120"/>
+                <a:ea typeface="標楷體" panose="03000509000000000000" pitchFamily="65" charset="-120"/>
+              </a:rPr>
+              <a:t>flatten</a:t>
+            </a:r>
+            <a:r>
+              <a:rPr lang="zh-TW" altLang="en-US" dirty="0">
+                <a:latin typeface="標楷體" panose="03000509000000000000" pitchFamily="65" charset="-120"/>
+                <a:ea typeface="標楷體" panose="03000509000000000000" pitchFamily="65" charset="-120"/>
+              </a:rPr>
+              <a:t>的模型基本上學不到任何東西</a:t>
+            </a:r>
+            <a:endParaRPr lang="en-US" altLang="zh-TW" dirty="0">
+              <a:latin typeface="標楷體" panose="03000509000000000000" pitchFamily="65" charset="-120"/>
+              <a:ea typeface="標楷體" panose="03000509000000000000" pitchFamily="65" charset="-120"/>
+            </a:endParaRPr>
+          </a:p>
+          <a:p>
+            <a:pPr lvl="1"/>
+            <a:r>
+              <a:rPr lang="zh-TW" altLang="en-US" dirty="0">
+                <a:latin typeface="標楷體" panose="03000509000000000000" pitchFamily="65" charset="-120"/>
+                <a:ea typeface="標楷體" panose="03000509000000000000" pitchFamily="65" charset="-120"/>
+              </a:rPr>
+              <a:t>下圖為</a:t>
+            </a:r>
+            <a:r>
+              <a:rPr lang="en-US" altLang="zh-TW" dirty="0">
+                <a:latin typeface="標楷體" panose="03000509000000000000" pitchFamily="65" charset="-120"/>
+                <a:ea typeface="標楷體" panose="03000509000000000000" pitchFamily="65" charset="-120"/>
+              </a:rPr>
+              <a:t>dense</a:t>
+            </a:r>
+            <a:r>
+              <a:rPr lang="zh-TW" altLang="en-US" dirty="0">
+                <a:latin typeface="標楷體" panose="03000509000000000000" pitchFamily="65" charset="-120"/>
+                <a:ea typeface="標楷體" panose="03000509000000000000" pitchFamily="65" charset="-120"/>
+              </a:rPr>
+              <a:t>和</a:t>
+            </a:r>
+            <a:r>
+              <a:rPr lang="en-US" altLang="zh-TW" dirty="0" err="1">
+                <a:latin typeface="標楷體" panose="03000509000000000000" pitchFamily="65" charset="-120"/>
+                <a:ea typeface="標楷體" panose="03000509000000000000" pitchFamily="65" charset="-120"/>
+              </a:rPr>
+              <a:t>lstm</a:t>
+            </a:r>
+            <a:r>
+              <a:rPr lang="zh-TW" altLang="en-US" dirty="0">
+                <a:latin typeface="標楷體" panose="03000509000000000000" pitchFamily="65" charset="-120"/>
+                <a:ea typeface="標楷體" panose="03000509000000000000" pitchFamily="65" charset="-120"/>
+              </a:rPr>
+              <a:t>的</a:t>
+            </a:r>
+            <a:r>
+              <a:rPr lang="en-US" altLang="zh-TW" dirty="0">
+                <a:latin typeface="標楷體" panose="03000509000000000000" pitchFamily="65" charset="-120"/>
+                <a:ea typeface="標楷體" panose="03000509000000000000" pitchFamily="65" charset="-120"/>
+              </a:rPr>
+              <a:t>accuracy</a:t>
+            </a:r>
+            <a:r>
+              <a:rPr lang="zh-TW" altLang="en-US" dirty="0">
+                <a:latin typeface="標楷體" panose="03000509000000000000" pitchFamily="65" charset="-120"/>
+                <a:ea typeface="標楷體" panose="03000509000000000000" pitchFamily="65" charset="-120"/>
+              </a:rPr>
+              <a:t>比較</a:t>
+            </a:r>
+            <a:endParaRPr lang="en-US" altLang="zh-TW" dirty="0">
+              <a:latin typeface="標楷體" panose="03000509000000000000" pitchFamily="65" charset="-120"/>
+              <a:ea typeface="標楷體" panose="03000509000000000000" pitchFamily="65" charset="-120"/>
+            </a:endParaRPr>
+          </a:p>
+        </p:txBody>
+      </p:sp>
+      <p:pic>
+        <p:nvPicPr>
+          <p:cNvPr id="9" name="圖片 8">
+            <a:extLst>
+              <a:ext uri="{FF2B5EF4-FFF2-40B4-BE49-F238E27FC236}">
+                <a16:creationId xmlns:a16="http://schemas.microsoft.com/office/drawing/2014/main" id="{EF290AD5-5B5D-47BD-8380-9A32ECB36233}"/>
+              </a:ext>
+            </a:extLst>
+          </p:cNvPr>
+          <p:cNvPicPr>
+            <a:picLocks noChangeAspect="1"/>
+          </p:cNvPicPr>
+          <p:nvPr/>
+        </p:nvPicPr>
+        <p:blipFill>
+          <a:blip r:embed="rId2">
+            <a:extLst>
+              <a:ext uri="{28A0092B-C50C-407E-A947-70E740481C1C}">
+                <a14:useLocalDpi xmlns:a14="http://schemas.microsoft.com/office/drawing/2010/main" val="0"/>
+              </a:ext>
+            </a:extLst>
+          </a:blip>
+          <a:stretch>
+            <a:fillRect/>
+          </a:stretch>
+        </p:blipFill>
+        <p:spPr>
+          <a:xfrm>
+            <a:off x="838199" y="3239399"/>
+            <a:ext cx="10011827" cy="3284303"/>
+          </a:xfrm>
+          <a:prstGeom prst="rect">
+            <a:avLst/>
+          </a:prstGeom>
+        </p:spPr>
+      </p:pic>
+      <p:pic>
+        <p:nvPicPr>
+          <p:cNvPr id="11" name="圖片 10">
+            <a:extLst>
+              <a:ext uri="{FF2B5EF4-FFF2-40B4-BE49-F238E27FC236}">
+                <a16:creationId xmlns:a16="http://schemas.microsoft.com/office/drawing/2014/main" id="{B591D193-50B6-4D40-A504-75428C55F547}"/>
+              </a:ext>
+            </a:extLst>
+          </p:cNvPr>
+          <p:cNvPicPr>
+            <a:picLocks noChangeAspect="1"/>
+          </p:cNvPicPr>
+          <p:nvPr/>
+        </p:nvPicPr>
+        <p:blipFill>
+          <a:blip r:embed="rId3">
+            <a:extLst>
+              <a:ext uri="{28A0092B-C50C-407E-A947-70E740481C1C}">
+                <a14:useLocalDpi xmlns:a14="http://schemas.microsoft.com/office/drawing/2010/main" val="0"/>
+              </a:ext>
+            </a:extLst>
+          </a:blip>
+          <a:stretch>
+            <a:fillRect/>
+          </a:stretch>
+        </p:blipFill>
+        <p:spPr>
+          <a:xfrm>
+            <a:off x="5432633" y="3346162"/>
+            <a:ext cx="3779520" cy="3177540"/>
+          </a:xfrm>
+          <a:prstGeom prst="rect">
+            <a:avLst/>
+          </a:prstGeom>
+        </p:spPr>
+      </p:pic>
+    </p:spTree>
+    <p:extLst>
+      <p:ext uri="{BB962C8B-B14F-4D97-AF65-F5344CB8AC3E}">
+        <p14:creationId xmlns:p14="http://schemas.microsoft.com/office/powerpoint/2010/main" val="1341418125"/>
+      </p:ext>
+    </p:extLst>
+  </p:cSld>
+  <p:clrMapOvr>
+    <a:masterClrMapping/>
+  </p:clrMapOvr>
+</p:sld>
+</file>
+
+<file path=ppt/slides/slide7.xml><?xml version="1.0" encoding="utf-8"?>
+<p:sld xmlns:a="http://schemas.openxmlformats.org/drawingml/2006/main" xmlns:r="http://schemas.openxmlformats.org/officeDocument/2006/relationships" xmlns:p="http://schemas.openxmlformats.org/presentationml/2006/main">
+  <p:cSld>
+    <p:spTree>
+      <p:nvGrpSpPr>
+        <p:cNvPr id="1" name=""/>
+        <p:cNvGrpSpPr/>
+        <p:nvPr/>
+      </p:nvGrpSpPr>
+      <p:grpSpPr>
+        <a:xfrm>
+          <a:off x="0" y="0"/>
+          <a:ext cx="0" cy="0"/>
+          <a:chOff x="0" y="0"/>
+          <a:chExt cx="0" cy="0"/>
+        </a:xfrm>
+      </p:grpSpPr>
+      <p:sp>
+        <p:nvSpPr>
+          <p:cNvPr id="2" name="標題 1">
+            <a:extLst>
+              <a:ext uri="{FF2B5EF4-FFF2-40B4-BE49-F238E27FC236}">
+                <a16:creationId xmlns:a16="http://schemas.microsoft.com/office/drawing/2014/main" id="{A5861B89-D1B6-449B-A717-B6084F6F9286}"/>
+              </a:ext>
+            </a:extLst>
+          </p:cNvPr>
+          <p:cNvSpPr>
+            <a:spLocks noGrp="1"/>
+          </p:cNvSpPr>
+          <p:nvPr>
+            <p:ph type="title"/>
+          </p:nvPr>
+        </p:nvSpPr>
+        <p:spPr/>
+        <p:txBody>
+          <a:bodyPr/>
+          <a:lstStyle/>
+          <a:p>
+            <a:pPr algn="ctr"/>
+            <a:r>
+              <a:rPr lang="zh-TW" altLang="en-US" dirty="0">
+                <a:latin typeface="標楷體" panose="03000509000000000000" pitchFamily="65" charset="-120"/>
+                <a:ea typeface="標楷體" panose="03000509000000000000" pitchFamily="65" charset="-120"/>
+              </a:rPr>
+              <a:t>模型訓練過程</a:t>
+            </a:r>
+          </a:p>
+        </p:txBody>
+      </p:sp>
+      <p:sp>
+        <p:nvSpPr>
+          <p:cNvPr id="3" name="內容版面配置區 2">
+            <a:extLst>
+              <a:ext uri="{FF2B5EF4-FFF2-40B4-BE49-F238E27FC236}">
+                <a16:creationId xmlns:a16="http://schemas.microsoft.com/office/drawing/2014/main" id="{6AC6DDCB-18F5-48C4-9DEB-10C4A97429AD}"/>
+              </a:ext>
+            </a:extLst>
+          </p:cNvPr>
+          <p:cNvSpPr>
+            <a:spLocks noGrp="1"/>
+          </p:cNvSpPr>
+          <p:nvPr>
+            <p:ph idx="1"/>
+          </p:nvPr>
+        </p:nvSpPr>
+        <p:spPr>
+          <a:xfrm>
+            <a:off x="838200" y="1825624"/>
+            <a:ext cx="10515600" cy="4563143"/>
+          </a:xfrm>
+        </p:spPr>
+        <p:txBody>
+          <a:bodyPr>
+            <a:normAutofit/>
+          </a:bodyPr>
+          <a:lstStyle/>
+          <a:p>
+            <a:r>
+              <a:rPr lang="en-US" altLang="zh-TW" dirty="0">
+                <a:latin typeface="標楷體" panose="03000509000000000000" pitchFamily="65" charset="-120"/>
+                <a:ea typeface="標楷體" panose="03000509000000000000" pitchFamily="65" charset="-120"/>
+              </a:rPr>
+              <a:t>2.Epoch</a:t>
+            </a:r>
+          </a:p>
+          <a:p>
+            <a:pPr lvl="1"/>
+            <a:r>
+              <a:rPr lang="zh-TW" altLang="en-US" dirty="0">
+                <a:latin typeface="標楷體" panose="03000509000000000000" pitchFamily="65" charset="-120"/>
+                <a:ea typeface="標楷體" panose="03000509000000000000" pitchFamily="65" charset="-120"/>
+              </a:rPr>
+              <a:t>一開始的</a:t>
+            </a:r>
+            <a:r>
+              <a:rPr lang="en-US" altLang="zh-TW" dirty="0">
+                <a:latin typeface="標楷體" panose="03000509000000000000" pitchFamily="65" charset="-120"/>
+                <a:ea typeface="標楷體" panose="03000509000000000000" pitchFamily="65" charset="-120"/>
+              </a:rPr>
+              <a:t>epoch</a:t>
+            </a:r>
+            <a:r>
+              <a:rPr lang="zh-TW" altLang="en-US" dirty="0">
+                <a:latin typeface="標楷體" panose="03000509000000000000" pitchFamily="65" charset="-120"/>
+                <a:ea typeface="標楷體" panose="03000509000000000000" pitchFamily="65" charset="-120"/>
+              </a:rPr>
+              <a:t>錯誤率高，隨著訓練代數越多準確率越高</a:t>
+            </a:r>
+            <a:endParaRPr lang="en-US" altLang="zh-TW" dirty="0">
+              <a:latin typeface="標楷體" panose="03000509000000000000" pitchFamily="65" charset="-120"/>
+              <a:ea typeface="標楷體" panose="03000509000000000000" pitchFamily="65" charset="-120"/>
+            </a:endParaRPr>
+          </a:p>
+          <a:p>
+            <a:pPr lvl="1"/>
+            <a:r>
+              <a:rPr lang="zh-TW" altLang="en-US" dirty="0">
+                <a:latin typeface="標楷體" panose="03000509000000000000" pitchFamily="65" charset="-120"/>
+                <a:ea typeface="標楷體" panose="03000509000000000000" pitchFamily="65" charset="-120"/>
+              </a:rPr>
+              <a:t>但是純</a:t>
+            </a:r>
+            <a:r>
+              <a:rPr lang="en-US" altLang="zh-TW" dirty="0">
+                <a:latin typeface="標楷體" panose="03000509000000000000" pitchFamily="65" charset="-120"/>
+                <a:ea typeface="標楷體" panose="03000509000000000000" pitchFamily="65" charset="-120"/>
+              </a:rPr>
+              <a:t>dense</a:t>
+            </a:r>
+            <a:r>
+              <a:rPr lang="zh-TW" altLang="en-US" dirty="0">
+                <a:latin typeface="標楷體" panose="03000509000000000000" pitchFamily="65" charset="-120"/>
+                <a:ea typeface="標楷體" panose="03000509000000000000" pitchFamily="65" charset="-120"/>
+              </a:rPr>
+              <a:t>模型會遇到模型的</a:t>
+            </a:r>
+            <a:r>
+              <a:rPr lang="en-US" altLang="zh-TW" dirty="0">
+                <a:latin typeface="標楷體" panose="03000509000000000000" pitchFamily="65" charset="-120"/>
+                <a:ea typeface="標楷體" panose="03000509000000000000" pitchFamily="65" charset="-120"/>
+              </a:rPr>
+              <a:t>loss</a:t>
+            </a:r>
+            <a:r>
+              <a:rPr lang="zh-TW" altLang="en-US" dirty="0">
+                <a:latin typeface="標楷體" panose="03000509000000000000" pitchFamily="65" charset="-120"/>
+                <a:ea typeface="標楷體" panose="03000509000000000000" pitchFamily="65" charset="-120"/>
+              </a:rPr>
+              <a:t>不動且</a:t>
+            </a:r>
+            <a:r>
+              <a:rPr lang="en-US" altLang="zh-TW" dirty="0">
+                <a:latin typeface="標楷體" panose="03000509000000000000" pitchFamily="65" charset="-120"/>
+                <a:ea typeface="標楷體" panose="03000509000000000000" pitchFamily="65" charset="-120"/>
+              </a:rPr>
+              <a:t>output</a:t>
+            </a:r>
+            <a:r>
+              <a:rPr lang="zh-TW" altLang="en-US" dirty="0">
+                <a:latin typeface="標楷體" panose="03000509000000000000" pitchFamily="65" charset="-120"/>
+                <a:ea typeface="標楷體" panose="03000509000000000000" pitchFamily="65" charset="-120"/>
+              </a:rPr>
+              <a:t>都同樣的情形發生，不知是否為梯度爆炸導致</a:t>
+            </a:r>
+            <a:endParaRPr lang="en-US" altLang="zh-TW" dirty="0">
+              <a:latin typeface="標楷體" panose="03000509000000000000" pitchFamily="65" charset="-120"/>
+              <a:ea typeface="標楷體" panose="03000509000000000000" pitchFamily="65" charset="-120"/>
+            </a:endParaRPr>
+          </a:p>
+          <a:p>
+            <a:pPr lvl="1"/>
+            <a:r>
+              <a:rPr lang="zh-TW" altLang="en-US" dirty="0">
+                <a:latin typeface="標楷體" panose="03000509000000000000" pitchFamily="65" charset="-120"/>
+                <a:ea typeface="標楷體" panose="03000509000000000000" pitchFamily="65" charset="-120"/>
+              </a:rPr>
+              <a:t>下圖為</a:t>
+            </a:r>
+            <a:r>
+              <a:rPr lang="en-US" altLang="zh-TW" dirty="0">
+                <a:latin typeface="標楷體" panose="03000509000000000000" pitchFamily="65" charset="-120"/>
+                <a:ea typeface="標楷體" panose="03000509000000000000" pitchFamily="65" charset="-120"/>
+              </a:rPr>
+              <a:t>LSTM</a:t>
+            </a:r>
+            <a:r>
+              <a:rPr lang="zh-TW" altLang="en-US" dirty="0">
+                <a:latin typeface="標楷體" panose="03000509000000000000" pitchFamily="65" charset="-120"/>
+                <a:ea typeface="標楷體" panose="03000509000000000000" pitchFamily="65" charset="-120"/>
+              </a:rPr>
+              <a:t>第</a:t>
+            </a:r>
+            <a:r>
+              <a:rPr lang="en-US" altLang="zh-TW" dirty="0">
+                <a:latin typeface="標楷體" panose="03000509000000000000" pitchFamily="65" charset="-120"/>
+                <a:ea typeface="標楷體" panose="03000509000000000000" pitchFamily="65" charset="-120"/>
+              </a:rPr>
+              <a:t>7</a:t>
+            </a:r>
+            <a:r>
+              <a:rPr lang="zh-TW" altLang="en-US" dirty="0">
+                <a:latin typeface="標楷體" panose="03000509000000000000" pitchFamily="65" charset="-120"/>
+                <a:ea typeface="標楷體" panose="03000509000000000000" pitchFamily="65" charset="-120"/>
+              </a:rPr>
+              <a:t>個</a:t>
+            </a:r>
+            <a:r>
+              <a:rPr lang="en-US" altLang="zh-TW" dirty="0">
+                <a:latin typeface="標楷體" panose="03000509000000000000" pitchFamily="65" charset="-120"/>
+                <a:ea typeface="標楷體" panose="03000509000000000000" pitchFamily="65" charset="-120"/>
+              </a:rPr>
+              <a:t>epoch</a:t>
+            </a:r>
+            <a:r>
+              <a:rPr lang="zh-TW" altLang="en-US" dirty="0">
+                <a:latin typeface="標楷體" panose="03000509000000000000" pitchFamily="65" charset="-120"/>
+                <a:ea typeface="標楷體" panose="03000509000000000000" pitchFamily="65" charset="-120"/>
+              </a:rPr>
+              <a:t>和第</a:t>
+            </a:r>
+            <a:r>
+              <a:rPr lang="en-US" altLang="zh-TW" dirty="0">
+                <a:latin typeface="標楷體" panose="03000509000000000000" pitchFamily="65" charset="-120"/>
+                <a:ea typeface="標楷體" panose="03000509000000000000" pitchFamily="65" charset="-120"/>
+              </a:rPr>
+              <a:t>49</a:t>
+            </a:r>
+            <a:r>
+              <a:rPr lang="zh-TW" altLang="en-US" dirty="0">
+                <a:latin typeface="標楷體" panose="03000509000000000000" pitchFamily="65" charset="-120"/>
+                <a:ea typeface="標楷體" panose="03000509000000000000" pitchFamily="65" charset="-120"/>
+              </a:rPr>
+              <a:t>個</a:t>
+            </a:r>
+            <a:r>
+              <a:rPr lang="en-US" altLang="zh-TW" dirty="0">
+                <a:latin typeface="標楷體" panose="03000509000000000000" pitchFamily="65" charset="-120"/>
+                <a:ea typeface="標楷體" panose="03000509000000000000" pitchFamily="65" charset="-120"/>
+              </a:rPr>
+              <a:t>epoch</a:t>
+            </a:r>
+          </a:p>
+          <a:p>
+            <a:endParaRPr lang="en-US" altLang="zh-TW" dirty="0">
+              <a:latin typeface="標楷體" panose="03000509000000000000" pitchFamily="65" charset="-120"/>
+              <a:ea typeface="標楷體" panose="03000509000000000000" pitchFamily="65" charset="-120"/>
+            </a:endParaRPr>
+          </a:p>
+        </p:txBody>
+      </p:sp>
+      <p:pic>
+        <p:nvPicPr>
+          <p:cNvPr id="7" name="圖片 6">
+            <a:extLst>
+              <a:ext uri="{FF2B5EF4-FFF2-40B4-BE49-F238E27FC236}">
+                <a16:creationId xmlns:a16="http://schemas.microsoft.com/office/drawing/2014/main" id="{A334A33C-6A25-49C3-A9A5-A3B66B009859}"/>
+              </a:ext>
+            </a:extLst>
+          </p:cNvPr>
+          <p:cNvPicPr>
+            <a:picLocks noChangeAspect="1"/>
+          </p:cNvPicPr>
+          <p:nvPr/>
+        </p:nvPicPr>
+        <p:blipFill>
+          <a:blip r:embed="rId2">
+            <a:extLst>
+              <a:ext uri="{28A0092B-C50C-407E-A947-70E740481C1C}">
+                <a14:useLocalDpi xmlns:a14="http://schemas.microsoft.com/office/drawing/2010/main" val="0"/>
+              </a:ext>
+            </a:extLst>
+          </a:blip>
+          <a:stretch>
+            <a:fillRect/>
+          </a:stretch>
+        </p:blipFill>
+        <p:spPr>
+          <a:xfrm>
+            <a:off x="407072" y="4003353"/>
+            <a:ext cx="6331708" cy="2564501"/>
+          </a:xfrm>
+          <a:prstGeom prst="rect">
+            <a:avLst/>
+          </a:prstGeom>
+        </p:spPr>
+      </p:pic>
+      <p:pic>
+        <p:nvPicPr>
+          <p:cNvPr id="5" name="圖片 4">
+            <a:extLst>
+              <a:ext uri="{FF2B5EF4-FFF2-40B4-BE49-F238E27FC236}">
+                <a16:creationId xmlns:a16="http://schemas.microsoft.com/office/drawing/2014/main" id="{0DB3DAF4-3C61-4C3C-9E53-9A9383C1755A}"/>
+              </a:ext>
+            </a:extLst>
+          </p:cNvPr>
+          <p:cNvPicPr>
+            <a:picLocks noChangeAspect="1"/>
+          </p:cNvPicPr>
+          <p:nvPr/>
+        </p:nvPicPr>
+        <p:blipFill>
+          <a:blip r:embed="rId3">
+            <a:extLst>
+              <a:ext uri="{28A0092B-C50C-407E-A947-70E740481C1C}">
+                <a14:useLocalDpi xmlns:a14="http://schemas.microsoft.com/office/drawing/2010/main" val="0"/>
+              </a:ext>
+            </a:extLst>
+          </a:blip>
+          <a:stretch>
+            <a:fillRect/>
+          </a:stretch>
+        </p:blipFill>
+        <p:spPr>
+          <a:xfrm>
+            <a:off x="3787253" y="4828989"/>
+            <a:ext cx="6205808" cy="1856537"/>
+          </a:xfrm>
+          <a:prstGeom prst="rect">
+            <a:avLst/>
+          </a:prstGeom>
+        </p:spPr>
+      </p:pic>
+    </p:spTree>
+    <p:extLst>
+      <p:ext uri="{BB962C8B-B14F-4D97-AF65-F5344CB8AC3E}">
+        <p14:creationId xmlns:p14="http://schemas.microsoft.com/office/powerpoint/2010/main" val="892952609"/>
+      </p:ext>
+    </p:extLst>
+  </p:cSld>
+  <p:clrMapOvr>
+    <a:masterClrMapping/>
+  </p:clrMapOvr>
+</p:sld>
+</file>
+
+<file path=ppt/slides/slide8.xml><?xml version="1.0" encoding="utf-8"?>
+<p:sld xmlns:a="http://schemas.openxmlformats.org/drawingml/2006/main" xmlns:r="http://schemas.openxmlformats.org/officeDocument/2006/relationships" xmlns:p="http://schemas.openxmlformats.org/presentationml/2006/main">
+  <p:cSld>
+    <p:spTree>
+      <p:nvGrpSpPr>
+        <p:cNvPr id="1" name=""/>
+        <p:cNvGrpSpPr/>
+        <p:nvPr/>
+      </p:nvGrpSpPr>
+      <p:grpSpPr>
+        <a:xfrm>
+          <a:off x="0" y="0"/>
+          <a:ext cx="0" cy="0"/>
+          <a:chOff x="0" y="0"/>
+          <a:chExt cx="0" cy="0"/>
+        </a:xfrm>
+      </p:grpSpPr>
+      <p:sp>
+        <p:nvSpPr>
+          <p:cNvPr id="2" name="標題 1">
+            <a:extLst>
+              <a:ext uri="{FF2B5EF4-FFF2-40B4-BE49-F238E27FC236}">
+                <a16:creationId xmlns:a16="http://schemas.microsoft.com/office/drawing/2014/main" id="{A5861B89-D1B6-449B-A717-B6084F6F9286}"/>
+              </a:ext>
+            </a:extLst>
+          </p:cNvPr>
+          <p:cNvSpPr>
+            <a:spLocks noGrp="1"/>
+          </p:cNvSpPr>
+          <p:nvPr>
+            <p:ph type="title"/>
+          </p:nvPr>
+        </p:nvSpPr>
+        <p:spPr/>
+        <p:txBody>
+          <a:bodyPr/>
+          <a:lstStyle/>
+          <a:p>
+            <a:pPr algn="ctr"/>
+            <a:r>
+              <a:rPr lang="zh-TW" altLang="en-US" dirty="0">
+                <a:latin typeface="標楷體" panose="03000509000000000000" pitchFamily="65" charset="-120"/>
+                <a:ea typeface="標楷體" panose="03000509000000000000" pitchFamily="65" charset="-120"/>
+              </a:rPr>
               <a:t>模型結果測試</a:t>
             </a:r>
           </a:p>
@@ -4624,7 +5912,21 @@
                 <a:latin typeface="標楷體" panose="03000509000000000000" pitchFamily="65" charset="-120"/>
                 <a:ea typeface="標楷體" panose="03000509000000000000" pitchFamily="65" charset="-120"/>
               </a:rPr>
-              <a:t>1.</a:t>
+              <a:t>1.(</a:t>
+            </a:r>
+            <a:r>
+              <a:rPr lang="en-US" altLang="zh-TW" dirty="0" err="1">
+                <a:latin typeface="標楷體" panose="03000509000000000000" pitchFamily="65" charset="-120"/>
+                <a:ea typeface="標楷體" panose="03000509000000000000" pitchFamily="65" charset="-120"/>
+              </a:rPr>
+              <a:t>Adder_Subtractor</a:t>
+            </a:r>
+            <a:r>
+              <a:rPr lang="en-US" altLang="zh-TW" dirty="0">
+                <a:latin typeface="標楷體" panose="03000509000000000000" pitchFamily="65" charset="-120"/>
+                <a:ea typeface="標楷體" panose="03000509000000000000" pitchFamily="65" charset="-120"/>
+              </a:rPr>
+              <a:t>)</a:t>
             </a:r>
             <a:r>
               <a:rPr lang="zh-TW" altLang="en-US" dirty="0">
@@ -4675,6 +5977,27 @@
           <a:p>
             <a:pPr lvl="1"/>
             <a:r>
+              <a:rPr lang="en-US" altLang="zh-TW" dirty="0">
+                <a:latin typeface="標楷體" panose="03000509000000000000" pitchFamily="65" charset="-120"/>
+                <a:ea typeface="標楷體" panose="03000509000000000000" pitchFamily="65" charset="-120"/>
+              </a:rPr>
+              <a:t>(</a:t>
+            </a:r>
+            <a:r>
+              <a:rPr lang="en-US" altLang="zh-TW" dirty="0" err="1">
+                <a:latin typeface="標楷體" panose="03000509000000000000" pitchFamily="65" charset="-120"/>
+                <a:ea typeface="標楷體" panose="03000509000000000000" pitchFamily="65" charset="-120"/>
+              </a:rPr>
+              <a:t>Adder_Subtractor</a:t>
+            </a:r>
+            <a:r>
+              <a:rPr lang="en-US" altLang="zh-TW" dirty="0">
+                <a:latin typeface="標楷體" panose="03000509000000000000" pitchFamily="65" charset="-120"/>
+                <a:ea typeface="標楷體" panose="03000509000000000000" pitchFamily="65" charset="-120"/>
+              </a:rPr>
+              <a:t>)</a:t>
+            </a:r>
+            <a:r>
               <a:rPr lang="zh-TW" altLang="en-US" dirty="0">
                 <a:latin typeface="標楷體" panose="03000509000000000000" pitchFamily="65" charset="-120"/>
                 <a:ea typeface="標楷體" panose="03000509000000000000" pitchFamily="65" charset="-120"/>
@@ -4703,6 +6026,27 @@
           <a:p>
             <a:pPr lvl="1"/>
             <a:r>
+              <a:rPr lang="en-US" altLang="zh-TW" dirty="0">
+                <a:latin typeface="標楷體" panose="03000509000000000000" pitchFamily="65" charset="-120"/>
+                <a:ea typeface="標楷體" panose="03000509000000000000" pitchFamily="65" charset="-120"/>
+              </a:rPr>
+              <a:t>(</a:t>
+            </a:r>
+            <a:r>
+              <a:rPr lang="en-US" altLang="zh-TW" dirty="0" err="1">
+                <a:latin typeface="標楷體" panose="03000509000000000000" pitchFamily="65" charset="-120"/>
+                <a:ea typeface="標楷體" panose="03000509000000000000" pitchFamily="65" charset="-120"/>
+              </a:rPr>
+              <a:t>Adder_Subtractor</a:t>
+            </a:r>
+            <a:r>
+              <a:rPr lang="en-US" altLang="zh-TW" dirty="0">
+                <a:latin typeface="標楷體" panose="03000509000000000000" pitchFamily="65" charset="-120"/>
+                <a:ea typeface="標楷體" panose="03000509000000000000" pitchFamily="65" charset="-120"/>
+              </a:rPr>
+              <a:t>)</a:t>
+            </a:r>
+            <a:r>
               <a:rPr lang="zh-TW" altLang="en-US" dirty="0">
                 <a:latin typeface="標楷體" panose="03000509000000000000" pitchFamily="65" charset="-120"/>
                 <a:ea typeface="標楷體" panose="03000509000000000000" pitchFamily="65" charset="-120"/>
@@ -4731,6 +6075,27 @@
           <a:p>
             <a:pPr lvl="1"/>
             <a:r>
+              <a:rPr lang="en-US" altLang="zh-TW" dirty="0">
+                <a:latin typeface="標楷體" panose="03000509000000000000" pitchFamily="65" charset="-120"/>
+                <a:ea typeface="標楷體" panose="03000509000000000000" pitchFamily="65" charset="-120"/>
+              </a:rPr>
+              <a:t>(</a:t>
+            </a:r>
+            <a:r>
+              <a:rPr lang="en-US" altLang="zh-TW" dirty="0" err="1">
+                <a:latin typeface="標楷體" panose="03000509000000000000" pitchFamily="65" charset="-120"/>
+                <a:ea typeface="標楷體" panose="03000509000000000000" pitchFamily="65" charset="-120"/>
+              </a:rPr>
+              <a:t>Adder_Subtractor</a:t>
+            </a:r>
+            <a:r>
+              <a:rPr lang="en-US" altLang="zh-TW" dirty="0">
+                <a:latin typeface="標楷體" panose="03000509000000000000" pitchFamily="65" charset="-120"/>
+                <a:ea typeface="標楷體" panose="03000509000000000000" pitchFamily="65" charset="-120"/>
+              </a:rPr>
+              <a:t>)</a:t>
+            </a:r>
+            <a:r>
               <a:rPr lang="zh-TW" altLang="en-US" dirty="0">
                 <a:latin typeface="標楷體" panose="03000509000000000000" pitchFamily="65" charset="-120"/>
                 <a:ea typeface="標楷體" panose="03000509000000000000" pitchFamily="65" charset="-120"/>
@@ -4801,25 +6166,60 @@
           <a:p>
             <a:pPr lvl="1"/>
             <a:r>
-              <a:rPr lang="zh-TW" altLang="en-US" dirty="0">
-                <a:latin typeface="標楷體" panose="03000509000000000000" pitchFamily="65" charset="-120"/>
-                <a:ea typeface="標楷體" panose="03000509000000000000" pitchFamily="65" charset="-120"/>
-              </a:rPr>
-              <a:t>最後計算</a:t>
-            </a:r>
-            <a:r>
-              <a:rPr lang="en-US" altLang="zh-TW" dirty="0">
-                <a:latin typeface="標楷體" panose="03000509000000000000" pitchFamily="65" charset="-120"/>
-                <a:ea typeface="標楷體" panose="03000509000000000000" pitchFamily="65" charset="-120"/>
-              </a:rPr>
-              <a:t>1000</a:t>
-            </a:r>
-            <a:r>
-              <a:rPr lang="zh-TW" altLang="en-US" dirty="0">
-                <a:latin typeface="標楷體" panose="03000509000000000000" pitchFamily="65" charset="-120"/>
-                <a:ea typeface="標楷體" panose="03000509000000000000" pitchFamily="65" charset="-120"/>
-              </a:rPr>
-              <a:t>筆測試資料中共答對幾筆並印出預測結果和每筆正解</a:t>
+              <a:rPr lang="en-US" altLang="zh-TW" dirty="0">
+                <a:latin typeface="標楷體" panose="03000509000000000000" pitchFamily="65" charset="-120"/>
+                <a:ea typeface="標楷體" panose="03000509000000000000" pitchFamily="65" charset="-120"/>
+              </a:rPr>
+              <a:t>(</a:t>
+            </a:r>
+            <a:r>
+              <a:rPr lang="en-US" altLang="zh-TW" dirty="0" err="1">
+                <a:latin typeface="標楷體" panose="03000509000000000000" pitchFamily="65" charset="-120"/>
+                <a:ea typeface="標楷體" panose="03000509000000000000" pitchFamily="65" charset="-120"/>
+              </a:rPr>
+              <a:t>Adder_Subtractor</a:t>
+            </a:r>
+            <a:r>
+              <a:rPr lang="en-US" altLang="zh-TW" dirty="0">
+                <a:latin typeface="標楷體" panose="03000509000000000000" pitchFamily="65" charset="-120"/>
+                <a:ea typeface="標楷體" panose="03000509000000000000" pitchFamily="65" charset="-120"/>
+              </a:rPr>
+              <a:t>, Adder, Subtractor)</a:t>
+            </a:r>
+            <a:r>
+              <a:rPr lang="zh-TW" altLang="en-US" dirty="0">
+                <a:latin typeface="標楷體" panose="03000509000000000000" pitchFamily="65" charset="-120"/>
+                <a:ea typeface="標楷體" panose="03000509000000000000" pitchFamily="65" charset="-120"/>
+              </a:rPr>
+              <a:t>使用</a:t>
+            </a:r>
+            <a:r>
+              <a:rPr lang="en-US" altLang="zh-TW" dirty="0" err="1">
+                <a:latin typeface="標楷體" panose="03000509000000000000" pitchFamily="65" charset="-120"/>
+                <a:ea typeface="標楷體" panose="03000509000000000000" pitchFamily="65" charset="-120"/>
+              </a:rPr>
+              <a:t>keras</a:t>
+            </a:r>
+            <a:r>
+              <a:rPr lang="zh-TW" altLang="en-US" dirty="0">
+                <a:latin typeface="標楷體" panose="03000509000000000000" pitchFamily="65" charset="-120"/>
+                <a:ea typeface="標楷體" panose="03000509000000000000" pitchFamily="65" charset="-120"/>
+              </a:rPr>
+              <a:t>本身的</a:t>
+            </a:r>
+            <a:r>
+              <a:rPr lang="en-US" altLang="zh-TW" dirty="0" err="1">
+                <a:latin typeface="標楷體" panose="03000509000000000000" pitchFamily="65" charset="-120"/>
+                <a:ea typeface="標楷體" panose="03000509000000000000" pitchFamily="65" charset="-120"/>
+              </a:rPr>
+              <a:t>model.evluate</a:t>
+            </a:r>
+            <a:r>
+              <a:rPr lang="zh-TW" altLang="en-US" dirty="0">
+                <a:latin typeface="標楷體" panose="03000509000000000000" pitchFamily="65" charset="-120"/>
+                <a:ea typeface="標楷體" panose="03000509000000000000" pitchFamily="65" charset="-120"/>
+              </a:rPr>
+              <a:t>來做評估</a:t>
             </a:r>
             <a:endParaRPr lang="en-US" altLang="zh-TW" dirty="0">
               <a:latin typeface="標楷體" panose="03000509000000000000" pitchFamily="65" charset="-120"/>

</xml_diff>